<commit_message>
minor changes in the idea
</commit_message>
<xml_diff>
--- a/Gov_templates/Customized_animation.pptx
+++ b/Gov_templates/Customized_animation.pptx
@@ -1706,7 +1706,7 @@
                 <a:spcPct val="100000"/>
               </a:lnSpc>
             </a:pPr>
-            <a:fld id="{95304498-7243-44C4-B0C9-520D68B25885}" type="datetime">
+            <a:fld id="{B800568A-9D9A-4F49-8104-D37953AF1433}" type="datetime">
               <a:rPr b="0" lang="en-IN" sz="1200" spc="-1" strike="noStrike">
                 <a:solidFill>
                   <a:srgbClr val="8b8b8b"/>
@@ -1776,7 +1776,7 @@
                 <a:spcPct val="100000"/>
               </a:lnSpc>
             </a:pPr>
-            <a:fld id="{5D790523-885C-499F-8830-08B7A20ADEA4}" type="slidenum">
+            <a:fld id="{544ECE70-AA9C-4455-9D02-42EEE1FFCD26}" type="slidenum">
               <a:rPr b="0" lang="en-IN" sz="1200" spc="-1" strike="noStrike">
                 <a:solidFill>
                   <a:srgbClr val="8b8b8b"/>
@@ -2208,7 +2208,7 @@
                 </a:solidFill>
                 <a:latin typeface="Calibri"/>
               </a:rPr>
-              <a:t>As a new image is added in the database a multi-resolution VP9(open source) encoded frame is created by a ‘pre-processing worker’ and then the location of the frame is stored along with the corresponding frame number.</a:t>
+              <a:t>As a new image is added in the database a multi-resolution VP9(open source) encoded frame is created by a ‘pre-processing worker’ and then the multi-resolution .mov frame is created and appended to the existing stream. Location of the frame is stored along with the corresponding frame number.</a:t>
             </a:r>
             <a:endParaRPr b="0" lang="en-US" sz="1800" spc="-1" strike="noStrike">
               <a:solidFill>
@@ -2268,7 +2268,16 @@
                 </a:solidFill>
                 <a:latin typeface="Calibri"/>
               </a:rPr>
-              <a:t>The webserver will only extract the required resolution and ‘adjust the frame rate’. The transcoded stream created at run time by the ‘display worker’ is spawned as the end user requests the service.</a:t>
+              <a:t> </a:t>
+            </a:r>
+            <a:r>
+              <a:rPr b="0" lang="en-US" sz="1800" spc="-1" strike="noStrike">
+                <a:solidFill>
+                  <a:srgbClr val="000000"/>
+                </a:solidFill>
+                <a:latin typeface="Calibri"/>
+              </a:rPr>
+              <a:t>The required resolution from the multi-resolution stream is extracted. The transcoded stream is created from the extracted stream while adjusting the frame rate at run time by the ‘display worker’. The display worker is spawned as the end user requests the service.</a:t>
             </a:r>
             <a:endParaRPr b="0" lang="en-US" sz="1800" spc="-1" strike="noStrike">
               <a:solidFill>

</xml_diff>